<commit_message>
pptx: Fix list level numbering
In PowerPoint, the content of a top-level list is at the same level as
the content of a top-level paragraph – the only difference is that a
list style has been applied.

At the moment, the pptx writer increments the paragraph level on each
list, turning what should be top-level lists into second-level lists.

This commit changes that logic, only incrementing the paragraph level on
continuation paragraphs of lists.

- Fixes https://github.com/jgm/pandoc/issues/4828
- Fixes https://github.com/jgm/pandoc/issues/4663
</commit_message>
<xml_diff>
--- a/test/pptx/code-custom/output.pptx
+++ b/test/pptx/code-custom/output.pptx
@@ -3170,7 +3170,7 @@
             </a:r>
           </a:p>
           <a:p>
-            <a:pPr lvl="1"/>
+            <a:pPr lvl="0"/>
             <a:r>
               <a:rPr/>
               <a:t>Bullet item with </a:t>
@@ -3194,7 +3194,7 @@
             </a:r>
           </a:p>
           <a:p>
-            <a:pPr lvl="2"/>
+            <a:pPr lvl="1"/>
             <a:r>
               <a:rPr/>
               <a:t>with </a:t>
@@ -3376,7 +3376,7 @@
             </a:r>
           </a:p>
           <a:p>
-            <a:pPr lvl="1"/>
+            <a:pPr lvl="0"/>
             <a:r>
               <a:rPr/>
               <a:t>Nested</a:t>
@@ -3551,7 +3551,7 @@
           <a:bodyPr/>
           <a:lstStyle/>
           <a:p>
-            <a:pPr lvl="1"/>
+            <a:pPr lvl="0"/>
             <a:r>
               <a:rPr/>
               <a:t>A total alternative for </a:t>

</xml_diff>